<commit_message>
finish search engine at to_thai
</commit_message>
<xml_diff>
--- a/54 exchange.pptx
+++ b/54 exchange.pptx
@@ -3393,14 +3393,14 @@
           <p:nvPr>
             <p:extLst>
               <p:ext uri="{D42A27DB-BD31-4B8C-83A1-F6EECF244321}">
-                <p14:modId xmlns:p14="http://schemas.microsoft.com/office/powerpoint/2010/main" val="4267844789"/>
+                <p14:modId xmlns:p14="http://schemas.microsoft.com/office/powerpoint/2010/main" val="3402976191"/>
               </p:ext>
             </p:extLst>
           </p:nvPr>
         </p:nvGraphicFramePr>
         <p:xfrm>
           <a:off x="-419100" y="18431"/>
-          <a:ext cx="13180412" cy="6929921"/>
+          <a:ext cx="13180412" cy="6839570"/>
         </p:xfrm>
         <a:graphic>
           <a:graphicData uri="http://schemas.openxmlformats.org/drawingml/2006/table">
@@ -3464,7 +3464,7 @@
                   </a:extLst>
                 </a:gridCol>
               </a:tblGrid>
-              <a:tr h="431400">
+              <a:tr h="457919">
                 <a:tc>
                   <a:txBody>
                     <a:bodyPr/>
@@ -3619,7 +3619,7 @@
                   </a:ext>
                 </a:extLst>
               </a:tr>
-              <a:tr h="925165">
+              <a:tr h="982036">
                 <a:tc rowSpan="11">
                   <a:txBody>
                     <a:bodyPr/>
@@ -3733,7 +3733,7 @@
                           <a:latin typeface="+mj-lt"/>
                           <a:cs typeface="+mn-cs"/>
                         </a:rPr>
-                        <a:t>                   </a:t>
+                        <a:t>      </a:t>
                       </a:r>
                       <a:r>
                         <a:rPr lang="km-KH" sz="3200" b="0" i="0" u="none" strike="noStrike" dirty="0">
@@ -3956,7 +3956,7 @@
                   </a:ext>
                 </a:extLst>
               </a:tr>
-              <a:tr h="463870">
+              <a:tr h="492385">
                 <a:tc vMerge="1">
                   <a:txBody>
                     <a:bodyPr/>
@@ -4116,7 +4116,7 @@
                   </a:ext>
                 </a:extLst>
               </a:tr>
-              <a:tr h="542730">
+              <a:tr h="576092">
                 <a:tc vMerge="1">
                   <a:txBody>
                     <a:bodyPr/>
@@ -4452,7 +4452,7 @@
                   </a:ext>
                 </a:extLst>
               </a:tr>
-              <a:tr h="387110">
+              <a:tr h="410906">
                 <a:tc vMerge="1">
                   <a:txBody>
                     <a:bodyPr/>
@@ -4723,7 +4723,7 @@
                   </a:ext>
                 </a:extLst>
               </a:tr>
-              <a:tr h="512624">
+              <a:tr h="544136">
                 <a:tc vMerge="1">
                   <a:txBody>
                     <a:bodyPr/>
@@ -4967,7 +4967,7 @@
                   </a:ext>
                 </a:extLst>
               </a:tr>
-              <a:tr h="412541">
+              <a:tr h="437900">
                 <a:tc vMerge="1">
                   <a:txBody>
                     <a:bodyPr/>
@@ -5245,7 +5245,7 @@
                   </a:ext>
                 </a:extLst>
               </a:tr>
-              <a:tr h="586998">
+              <a:tr h="623081">
                 <a:tc vMerge="1">
                   <a:txBody>
                     <a:bodyPr/>
@@ -5387,7 +5387,7 @@
                   </a:ext>
                 </a:extLst>
               </a:tr>
-              <a:tr h="870012">
+              <a:tr h="923493">
                 <a:tc vMerge="1">
                   <a:txBody>
                     <a:bodyPr/>
@@ -5661,7 +5661,7 @@
                   </a:ext>
                 </a:extLst>
               </a:tr>
-              <a:tr h="0">
+              <a:tr h="398354">
                 <a:tc vMerge="1">
                   <a:txBody>
                     <a:bodyPr/>
@@ -5862,7 +5862,7 @@
                   </a:ext>
                 </a:extLst>
               </a:tr>
-              <a:tr h="504346">
+              <a:tr h="535349">
                 <a:tc vMerge="1">
                   <a:txBody>
                     <a:bodyPr/>
@@ -6117,7 +6117,7 @@
                   </a:ext>
                 </a:extLst>
               </a:tr>
-              <a:tr h="431400">
+              <a:tr h="457919">
                 <a:tc vMerge="1">
                   <a:txBody>
                     <a:bodyPr/>
@@ -6256,13 +6256,13 @@
           <p:nvPr>
             <p:extLst>
               <p:ext uri="{D42A27DB-BD31-4B8C-83A1-F6EECF244321}">
-                <p14:modId xmlns:p14="http://schemas.microsoft.com/office/powerpoint/2010/main" val="3126658609"/>
+                <p14:modId xmlns:p14="http://schemas.microsoft.com/office/powerpoint/2010/main" val="1153415363"/>
               </p:ext>
             </p:extLst>
           </p:nvPr>
         </p:nvGraphicFramePr>
         <p:xfrm>
-          <a:off x="1914411" y="3905186"/>
+          <a:off x="1870023" y="3621100"/>
           <a:ext cx="1261840" cy="618045"/>
         </p:xfrm>
         <a:graphic>
@@ -6290,7 +6290,7 @@
                     </p:blipFill>
                     <p:spPr>
                       <a:xfrm>
-                        <a:off x="1914411" y="3905186"/>
+                        <a:off x="1870023" y="3621100"/>
                         <a:ext cx="1261840" cy="618045"/>
                       </a:xfrm>
                       <a:prstGeom prst="rect">
@@ -6319,13 +6319,13 @@
           <p:nvPr>
             <p:extLst>
               <p:ext uri="{D42A27DB-BD31-4B8C-83A1-F6EECF244321}">
-                <p14:modId xmlns:p14="http://schemas.microsoft.com/office/powerpoint/2010/main" val="416703673"/>
+                <p14:modId xmlns:p14="http://schemas.microsoft.com/office/powerpoint/2010/main" val="2847056432"/>
               </p:ext>
             </p:extLst>
           </p:nvPr>
         </p:nvGraphicFramePr>
         <p:xfrm>
-          <a:off x="1914411" y="4857559"/>
+          <a:off x="1870023" y="4573473"/>
           <a:ext cx="1261840" cy="618045"/>
         </p:xfrm>
         <a:graphic>
@@ -6353,7 +6353,7 @@
                     </p:blipFill>
                     <p:spPr>
                       <a:xfrm>
-                        <a:off x="1914411" y="4857559"/>
+                        <a:off x="1870023" y="4573473"/>
                         <a:ext cx="1261840" cy="618045"/>
                       </a:xfrm>
                       <a:prstGeom prst="rect">
@@ -6382,13 +6382,13 @@
           <p:nvPr>
             <p:extLst>
               <p:ext uri="{D42A27DB-BD31-4B8C-83A1-F6EECF244321}">
-                <p14:modId xmlns:p14="http://schemas.microsoft.com/office/powerpoint/2010/main" val="1664303936"/>
+                <p14:modId xmlns:p14="http://schemas.microsoft.com/office/powerpoint/2010/main" val="230832503"/>
               </p:ext>
             </p:extLst>
           </p:nvPr>
         </p:nvGraphicFramePr>
         <p:xfrm>
-          <a:off x="7049035" y="2956545"/>
+          <a:off x="7004647" y="2672459"/>
           <a:ext cx="1261840" cy="618045"/>
         </p:xfrm>
         <a:graphic>
@@ -6416,7 +6416,7 @@
                     </p:blipFill>
                     <p:spPr>
                       <a:xfrm>
-                        <a:off x="7049035" y="2956545"/>
+                        <a:off x="7004647" y="2672459"/>
                         <a:ext cx="1261840" cy="618045"/>
                       </a:xfrm>
                       <a:prstGeom prst="rect">
@@ -6445,13 +6445,13 @@
           <p:nvPr>
             <p:extLst>
               <p:ext uri="{D42A27DB-BD31-4B8C-83A1-F6EECF244321}">
-                <p14:modId xmlns:p14="http://schemas.microsoft.com/office/powerpoint/2010/main" val="2211768581"/>
+                <p14:modId xmlns:p14="http://schemas.microsoft.com/office/powerpoint/2010/main" val="1641721770"/>
               </p:ext>
             </p:extLst>
           </p:nvPr>
         </p:nvGraphicFramePr>
         <p:xfrm>
-          <a:off x="7049035" y="3905185"/>
+          <a:off x="7004647" y="3621099"/>
           <a:ext cx="1261840" cy="618045"/>
         </p:xfrm>
         <a:graphic>
@@ -6479,7 +6479,7 @@
                     </p:blipFill>
                     <p:spPr>
                       <a:xfrm>
-                        <a:off x="7049035" y="3905185"/>
+                        <a:off x="7004647" y="3621099"/>
                         <a:ext cx="1261840" cy="618045"/>
                       </a:xfrm>
                       <a:prstGeom prst="rect">
@@ -6508,13 +6508,13 @@
           <p:nvPr>
             <p:extLst>
               <p:ext uri="{D42A27DB-BD31-4B8C-83A1-F6EECF244321}">
-                <p14:modId xmlns:p14="http://schemas.microsoft.com/office/powerpoint/2010/main" val="1379461287"/>
+                <p14:modId xmlns:p14="http://schemas.microsoft.com/office/powerpoint/2010/main" val="3752939575"/>
               </p:ext>
             </p:extLst>
           </p:nvPr>
         </p:nvGraphicFramePr>
         <p:xfrm>
-          <a:off x="7049035" y="4857559"/>
+          <a:off x="7004647" y="4573473"/>
           <a:ext cx="1261840" cy="618045"/>
         </p:xfrm>
         <a:graphic>
@@ -6542,7 +6542,7 @@
                     </p:blipFill>
                     <p:spPr>
                       <a:xfrm>
-                        <a:off x="7049035" y="4857559"/>
+                        <a:off x="7004647" y="4573473"/>
                         <a:ext cx="1261840" cy="618045"/>
                       </a:xfrm>
                       <a:prstGeom prst="rect">
@@ -6571,13 +6571,13 @@
           <p:nvPr>
             <p:extLst>
               <p:ext uri="{D42A27DB-BD31-4B8C-83A1-F6EECF244321}">
-                <p14:modId xmlns:p14="http://schemas.microsoft.com/office/powerpoint/2010/main" val="1306632995"/>
+                <p14:modId xmlns:p14="http://schemas.microsoft.com/office/powerpoint/2010/main" val="1545018146"/>
               </p:ext>
             </p:extLst>
           </p:nvPr>
         </p:nvGraphicFramePr>
         <p:xfrm>
-          <a:off x="1914413" y="2952814"/>
+          <a:off x="1870025" y="2668728"/>
           <a:ext cx="1261838" cy="618044"/>
         </p:xfrm>
         <a:graphic>
@@ -6605,7 +6605,7 @@
                     </p:blipFill>
                     <p:spPr>
                       <a:xfrm>
-                        <a:off x="1914413" y="2952814"/>
+                        <a:off x="1870025" y="2668728"/>
                         <a:ext cx="1261838" cy="618044"/>
                       </a:xfrm>
                       <a:prstGeom prst="rect">

</xml_diff>

<commit_message>
add see more... bn
</commit_message>
<xml_diff>
--- a/54 exchange.pptx
+++ b/54 exchange.pptx
@@ -197,7 +197,7 @@
           <a:p>
             <a:fld id="{50B5AD24-ECDF-4EDA-9C47-E358CABA4C31}" type="datetimeFigureOut">
               <a:rPr lang="en-US" smtClean="0"/>
-              <a:t>2021-03-18</a:t>
+              <a:t>2021-03-20</a:t>
             </a:fld>
             <a:endParaRPr lang="en-US" dirty="0"/>
           </a:p>
@@ -677,7 +677,7 @@
           <a:p>
             <a:fld id="{7906AA06-BD78-4A04-91CE-C24DF0E18808}" type="datetimeFigureOut">
               <a:rPr lang="en-US" smtClean="0"/>
-              <a:t>2021-03-18</a:t>
+              <a:t>2021-03-20</a:t>
             </a:fld>
             <a:endParaRPr lang="en-US" dirty="0"/>
           </a:p>
@@ -845,7 +845,7 @@
           <a:p>
             <a:fld id="{7906AA06-BD78-4A04-91CE-C24DF0E18808}" type="datetimeFigureOut">
               <a:rPr lang="en-US" smtClean="0"/>
-              <a:t>2021-03-18</a:t>
+              <a:t>2021-03-20</a:t>
             </a:fld>
             <a:endParaRPr lang="en-US" dirty="0"/>
           </a:p>
@@ -1023,7 +1023,7 @@
           <a:p>
             <a:fld id="{7906AA06-BD78-4A04-91CE-C24DF0E18808}" type="datetimeFigureOut">
               <a:rPr lang="en-US" smtClean="0"/>
-              <a:t>2021-03-18</a:t>
+              <a:t>2021-03-20</a:t>
             </a:fld>
             <a:endParaRPr lang="en-US" dirty="0"/>
           </a:p>
@@ -1191,7 +1191,7 @@
           <a:p>
             <a:fld id="{7906AA06-BD78-4A04-91CE-C24DF0E18808}" type="datetimeFigureOut">
               <a:rPr lang="en-US" smtClean="0"/>
-              <a:t>2021-03-18</a:t>
+              <a:t>2021-03-20</a:t>
             </a:fld>
             <a:endParaRPr lang="en-US" dirty="0"/>
           </a:p>
@@ -1436,7 +1436,7 @@
           <a:p>
             <a:fld id="{7906AA06-BD78-4A04-91CE-C24DF0E18808}" type="datetimeFigureOut">
               <a:rPr lang="en-US" smtClean="0"/>
-              <a:t>2021-03-18</a:t>
+              <a:t>2021-03-20</a:t>
             </a:fld>
             <a:endParaRPr lang="en-US" dirty="0"/>
           </a:p>
@@ -1665,7 +1665,7 @@
           <a:p>
             <a:fld id="{7906AA06-BD78-4A04-91CE-C24DF0E18808}" type="datetimeFigureOut">
               <a:rPr lang="en-US" smtClean="0"/>
-              <a:t>2021-03-18</a:t>
+              <a:t>2021-03-20</a:t>
             </a:fld>
             <a:endParaRPr lang="en-US" dirty="0"/>
           </a:p>
@@ -2029,7 +2029,7 @@
           <a:p>
             <a:fld id="{7906AA06-BD78-4A04-91CE-C24DF0E18808}" type="datetimeFigureOut">
               <a:rPr lang="en-US" smtClean="0"/>
-              <a:t>2021-03-18</a:t>
+              <a:t>2021-03-20</a:t>
             </a:fld>
             <a:endParaRPr lang="en-US" dirty="0"/>
           </a:p>
@@ -2146,7 +2146,7 @@
           <a:p>
             <a:fld id="{7906AA06-BD78-4A04-91CE-C24DF0E18808}" type="datetimeFigureOut">
               <a:rPr lang="en-US" smtClean="0"/>
-              <a:t>2021-03-18</a:t>
+              <a:t>2021-03-20</a:t>
             </a:fld>
             <a:endParaRPr lang="en-US" dirty="0"/>
           </a:p>
@@ -2241,7 +2241,7 @@
           <a:p>
             <a:fld id="{7906AA06-BD78-4A04-91CE-C24DF0E18808}" type="datetimeFigureOut">
               <a:rPr lang="en-US" smtClean="0"/>
-              <a:t>2021-03-18</a:t>
+              <a:t>2021-03-20</a:t>
             </a:fld>
             <a:endParaRPr lang="en-US" dirty="0"/>
           </a:p>
@@ -2516,7 +2516,7 @@
           <a:p>
             <a:fld id="{7906AA06-BD78-4A04-91CE-C24DF0E18808}" type="datetimeFigureOut">
               <a:rPr lang="en-US" smtClean="0"/>
-              <a:t>2021-03-18</a:t>
+              <a:t>2021-03-20</a:t>
             </a:fld>
             <a:endParaRPr lang="en-US" dirty="0"/>
           </a:p>
@@ -2768,7 +2768,7 @@
           <a:p>
             <a:fld id="{7906AA06-BD78-4A04-91CE-C24DF0E18808}" type="datetimeFigureOut">
               <a:rPr lang="en-US" smtClean="0"/>
-              <a:t>2021-03-18</a:t>
+              <a:t>2021-03-20</a:t>
             </a:fld>
             <a:endParaRPr lang="en-US" dirty="0"/>
           </a:p>
@@ -2979,7 +2979,7 @@
           <a:p>
             <a:fld id="{7906AA06-BD78-4A04-91CE-C24DF0E18808}" type="datetimeFigureOut">
               <a:rPr lang="en-US" smtClean="0"/>
-              <a:t>2021-03-18</a:t>
+              <a:t>2021-03-20</a:t>
             </a:fld>
             <a:endParaRPr lang="en-US" dirty="0"/>
           </a:p>
@@ -6256,7 +6256,7 @@
           <p:nvPr>
             <p:extLst>
               <p:ext uri="{D42A27DB-BD31-4B8C-83A1-F6EECF244321}">
-                <p14:modId xmlns:p14="http://schemas.microsoft.com/office/powerpoint/2010/main" val="2883336791"/>
+                <p14:modId xmlns:p14="http://schemas.microsoft.com/office/powerpoint/2010/main" val="3715019680"/>
               </p:ext>
             </p:extLst>
           </p:nvPr>
@@ -6319,7 +6319,7 @@
           <p:nvPr>
             <p:extLst>
               <p:ext uri="{D42A27DB-BD31-4B8C-83A1-F6EECF244321}">
-                <p14:modId xmlns:p14="http://schemas.microsoft.com/office/powerpoint/2010/main" val="427118783"/>
+                <p14:modId xmlns:p14="http://schemas.microsoft.com/office/powerpoint/2010/main" val="1923839355"/>
               </p:ext>
             </p:extLst>
           </p:nvPr>
@@ -6382,7 +6382,7 @@
           <p:nvPr>
             <p:extLst>
               <p:ext uri="{D42A27DB-BD31-4B8C-83A1-F6EECF244321}">
-                <p14:modId xmlns:p14="http://schemas.microsoft.com/office/powerpoint/2010/main" val="3223665361"/>
+                <p14:modId xmlns:p14="http://schemas.microsoft.com/office/powerpoint/2010/main" val="1021175754"/>
               </p:ext>
             </p:extLst>
           </p:nvPr>
@@ -6445,7 +6445,7 @@
           <p:nvPr>
             <p:extLst>
               <p:ext uri="{D42A27DB-BD31-4B8C-83A1-F6EECF244321}">
-                <p14:modId xmlns:p14="http://schemas.microsoft.com/office/powerpoint/2010/main" val="2763353094"/>
+                <p14:modId xmlns:p14="http://schemas.microsoft.com/office/powerpoint/2010/main" val="1149772455"/>
               </p:ext>
             </p:extLst>
           </p:nvPr>
@@ -6508,7 +6508,7 @@
           <p:nvPr>
             <p:extLst>
               <p:ext uri="{D42A27DB-BD31-4B8C-83A1-F6EECF244321}">
-                <p14:modId xmlns:p14="http://schemas.microsoft.com/office/powerpoint/2010/main" val="256341362"/>
+                <p14:modId xmlns:p14="http://schemas.microsoft.com/office/powerpoint/2010/main" val="3869881320"/>
               </p:ext>
             </p:extLst>
           </p:nvPr>
@@ -6571,7 +6571,7 @@
           <p:nvPr>
             <p:extLst>
               <p:ext uri="{D42A27DB-BD31-4B8C-83A1-F6EECF244321}">
-                <p14:modId xmlns:p14="http://schemas.microsoft.com/office/powerpoint/2010/main" val="2188286746"/>
+                <p14:modId xmlns:p14="http://schemas.microsoft.com/office/powerpoint/2010/main" val="3285318636"/>
               </p:ext>
             </p:extLst>
           </p:nvPr>

</xml_diff>

<commit_message>
add see more..... in to_thai
</commit_message>
<xml_diff>
--- a/54 exchange.pptx
+++ b/54 exchange.pptx
@@ -197,7 +197,7 @@
           <a:p>
             <a:fld id="{50B5AD24-ECDF-4EDA-9C47-E358CABA4C31}" type="datetimeFigureOut">
               <a:rPr lang="en-US" smtClean="0"/>
-              <a:t>2021-03-20</a:t>
+              <a:t>2021-03-21</a:t>
             </a:fld>
             <a:endParaRPr lang="en-US" dirty="0"/>
           </a:p>
@@ -677,7 +677,7 @@
           <a:p>
             <a:fld id="{7906AA06-BD78-4A04-91CE-C24DF0E18808}" type="datetimeFigureOut">
               <a:rPr lang="en-US" smtClean="0"/>
-              <a:t>2021-03-20</a:t>
+              <a:t>2021-03-21</a:t>
             </a:fld>
             <a:endParaRPr lang="en-US" dirty="0"/>
           </a:p>
@@ -845,7 +845,7 @@
           <a:p>
             <a:fld id="{7906AA06-BD78-4A04-91CE-C24DF0E18808}" type="datetimeFigureOut">
               <a:rPr lang="en-US" smtClean="0"/>
-              <a:t>2021-03-20</a:t>
+              <a:t>2021-03-21</a:t>
             </a:fld>
             <a:endParaRPr lang="en-US" dirty="0"/>
           </a:p>
@@ -1023,7 +1023,7 @@
           <a:p>
             <a:fld id="{7906AA06-BD78-4A04-91CE-C24DF0E18808}" type="datetimeFigureOut">
               <a:rPr lang="en-US" smtClean="0"/>
-              <a:t>2021-03-20</a:t>
+              <a:t>2021-03-21</a:t>
             </a:fld>
             <a:endParaRPr lang="en-US" dirty="0"/>
           </a:p>
@@ -1191,7 +1191,7 @@
           <a:p>
             <a:fld id="{7906AA06-BD78-4A04-91CE-C24DF0E18808}" type="datetimeFigureOut">
               <a:rPr lang="en-US" smtClean="0"/>
-              <a:t>2021-03-20</a:t>
+              <a:t>2021-03-21</a:t>
             </a:fld>
             <a:endParaRPr lang="en-US" dirty="0"/>
           </a:p>
@@ -1436,7 +1436,7 @@
           <a:p>
             <a:fld id="{7906AA06-BD78-4A04-91CE-C24DF0E18808}" type="datetimeFigureOut">
               <a:rPr lang="en-US" smtClean="0"/>
-              <a:t>2021-03-20</a:t>
+              <a:t>2021-03-21</a:t>
             </a:fld>
             <a:endParaRPr lang="en-US" dirty="0"/>
           </a:p>
@@ -1665,7 +1665,7 @@
           <a:p>
             <a:fld id="{7906AA06-BD78-4A04-91CE-C24DF0E18808}" type="datetimeFigureOut">
               <a:rPr lang="en-US" smtClean="0"/>
-              <a:t>2021-03-20</a:t>
+              <a:t>2021-03-21</a:t>
             </a:fld>
             <a:endParaRPr lang="en-US" dirty="0"/>
           </a:p>
@@ -2029,7 +2029,7 @@
           <a:p>
             <a:fld id="{7906AA06-BD78-4A04-91CE-C24DF0E18808}" type="datetimeFigureOut">
               <a:rPr lang="en-US" smtClean="0"/>
-              <a:t>2021-03-20</a:t>
+              <a:t>2021-03-21</a:t>
             </a:fld>
             <a:endParaRPr lang="en-US" dirty="0"/>
           </a:p>
@@ -2146,7 +2146,7 @@
           <a:p>
             <a:fld id="{7906AA06-BD78-4A04-91CE-C24DF0E18808}" type="datetimeFigureOut">
               <a:rPr lang="en-US" smtClean="0"/>
-              <a:t>2021-03-20</a:t>
+              <a:t>2021-03-21</a:t>
             </a:fld>
             <a:endParaRPr lang="en-US" dirty="0"/>
           </a:p>
@@ -2241,7 +2241,7 @@
           <a:p>
             <a:fld id="{7906AA06-BD78-4A04-91CE-C24DF0E18808}" type="datetimeFigureOut">
               <a:rPr lang="en-US" smtClean="0"/>
-              <a:t>2021-03-20</a:t>
+              <a:t>2021-03-21</a:t>
             </a:fld>
             <a:endParaRPr lang="en-US" dirty="0"/>
           </a:p>
@@ -2516,7 +2516,7 @@
           <a:p>
             <a:fld id="{7906AA06-BD78-4A04-91CE-C24DF0E18808}" type="datetimeFigureOut">
               <a:rPr lang="en-US" smtClean="0"/>
-              <a:t>2021-03-20</a:t>
+              <a:t>2021-03-21</a:t>
             </a:fld>
             <a:endParaRPr lang="en-US" dirty="0"/>
           </a:p>
@@ -2768,7 +2768,7 @@
           <a:p>
             <a:fld id="{7906AA06-BD78-4A04-91CE-C24DF0E18808}" type="datetimeFigureOut">
               <a:rPr lang="en-US" smtClean="0"/>
-              <a:t>2021-03-20</a:t>
+              <a:t>2021-03-21</a:t>
             </a:fld>
             <a:endParaRPr lang="en-US" dirty="0"/>
           </a:p>
@@ -2979,7 +2979,7 @@
           <a:p>
             <a:fld id="{7906AA06-BD78-4A04-91CE-C24DF0E18808}" type="datetimeFigureOut">
               <a:rPr lang="en-US" smtClean="0"/>
-              <a:t>2021-03-20</a:t>
+              <a:t>2021-03-21</a:t>
             </a:fld>
             <a:endParaRPr lang="en-US" dirty="0"/>
           </a:p>
@@ -6256,7 +6256,7 @@
           <p:nvPr>
             <p:extLst>
               <p:ext uri="{D42A27DB-BD31-4B8C-83A1-F6EECF244321}">
-                <p14:modId xmlns:p14="http://schemas.microsoft.com/office/powerpoint/2010/main" val="3715019680"/>
+                <p14:modId xmlns:p14="http://schemas.microsoft.com/office/powerpoint/2010/main" val="1016825859"/>
               </p:ext>
             </p:extLst>
           </p:nvPr>
@@ -6319,7 +6319,7 @@
           <p:nvPr>
             <p:extLst>
               <p:ext uri="{D42A27DB-BD31-4B8C-83A1-F6EECF244321}">
-                <p14:modId xmlns:p14="http://schemas.microsoft.com/office/powerpoint/2010/main" val="1923839355"/>
+                <p14:modId xmlns:p14="http://schemas.microsoft.com/office/powerpoint/2010/main" val="2030331471"/>
               </p:ext>
             </p:extLst>
           </p:nvPr>
@@ -6382,7 +6382,7 @@
           <p:nvPr>
             <p:extLst>
               <p:ext uri="{D42A27DB-BD31-4B8C-83A1-F6EECF244321}">
-                <p14:modId xmlns:p14="http://schemas.microsoft.com/office/powerpoint/2010/main" val="1021175754"/>
+                <p14:modId xmlns:p14="http://schemas.microsoft.com/office/powerpoint/2010/main" val="2027512070"/>
               </p:ext>
             </p:extLst>
           </p:nvPr>
@@ -6445,7 +6445,7 @@
           <p:nvPr>
             <p:extLst>
               <p:ext uri="{D42A27DB-BD31-4B8C-83A1-F6EECF244321}">
-                <p14:modId xmlns:p14="http://schemas.microsoft.com/office/powerpoint/2010/main" val="1149772455"/>
+                <p14:modId xmlns:p14="http://schemas.microsoft.com/office/powerpoint/2010/main" val="3787676214"/>
               </p:ext>
             </p:extLst>
           </p:nvPr>
@@ -6508,7 +6508,7 @@
           <p:nvPr>
             <p:extLst>
               <p:ext uri="{D42A27DB-BD31-4B8C-83A1-F6EECF244321}">
-                <p14:modId xmlns:p14="http://schemas.microsoft.com/office/powerpoint/2010/main" val="3869881320"/>
+                <p14:modId xmlns:p14="http://schemas.microsoft.com/office/powerpoint/2010/main" val="829568486"/>
               </p:ext>
             </p:extLst>
           </p:nvPr>
@@ -6571,7 +6571,7 @@
           <p:nvPr>
             <p:extLst>
               <p:ext uri="{D42A27DB-BD31-4B8C-83A1-F6EECF244321}">
-                <p14:modId xmlns:p14="http://schemas.microsoft.com/office/powerpoint/2010/main" val="3285318636"/>
+                <p14:modId xmlns:p14="http://schemas.microsoft.com/office/powerpoint/2010/main" val="1660297839"/>
               </p:ext>
             </p:extLst>
           </p:nvPr>

</xml_diff>

<commit_message>
add arrow key press
</commit_message>
<xml_diff>
--- a/54 exchange.pptx
+++ b/54 exchange.pptx
@@ -197,7 +197,7 @@
           <a:p>
             <a:fld id="{50B5AD24-ECDF-4EDA-9C47-E358CABA4C31}" type="datetimeFigureOut">
               <a:rPr lang="en-US" smtClean="0"/>
-              <a:t>2021-03-22</a:t>
+              <a:t>2021-03-23</a:t>
             </a:fld>
             <a:endParaRPr lang="en-US" dirty="0"/>
           </a:p>
@@ -677,7 +677,7 @@
           <a:p>
             <a:fld id="{7906AA06-BD78-4A04-91CE-C24DF0E18808}" type="datetimeFigureOut">
               <a:rPr lang="en-US" smtClean="0"/>
-              <a:t>2021-03-22</a:t>
+              <a:t>2021-03-23</a:t>
             </a:fld>
             <a:endParaRPr lang="en-US" dirty="0"/>
           </a:p>
@@ -845,7 +845,7 @@
           <a:p>
             <a:fld id="{7906AA06-BD78-4A04-91CE-C24DF0E18808}" type="datetimeFigureOut">
               <a:rPr lang="en-US" smtClean="0"/>
-              <a:t>2021-03-22</a:t>
+              <a:t>2021-03-23</a:t>
             </a:fld>
             <a:endParaRPr lang="en-US" dirty="0"/>
           </a:p>
@@ -1023,7 +1023,7 @@
           <a:p>
             <a:fld id="{7906AA06-BD78-4A04-91CE-C24DF0E18808}" type="datetimeFigureOut">
               <a:rPr lang="en-US" smtClean="0"/>
-              <a:t>2021-03-22</a:t>
+              <a:t>2021-03-23</a:t>
             </a:fld>
             <a:endParaRPr lang="en-US" dirty="0"/>
           </a:p>
@@ -1191,7 +1191,7 @@
           <a:p>
             <a:fld id="{7906AA06-BD78-4A04-91CE-C24DF0E18808}" type="datetimeFigureOut">
               <a:rPr lang="en-US" smtClean="0"/>
-              <a:t>2021-03-22</a:t>
+              <a:t>2021-03-23</a:t>
             </a:fld>
             <a:endParaRPr lang="en-US" dirty="0"/>
           </a:p>
@@ -1436,7 +1436,7 @@
           <a:p>
             <a:fld id="{7906AA06-BD78-4A04-91CE-C24DF0E18808}" type="datetimeFigureOut">
               <a:rPr lang="en-US" smtClean="0"/>
-              <a:t>2021-03-22</a:t>
+              <a:t>2021-03-23</a:t>
             </a:fld>
             <a:endParaRPr lang="en-US" dirty="0"/>
           </a:p>
@@ -1665,7 +1665,7 @@
           <a:p>
             <a:fld id="{7906AA06-BD78-4A04-91CE-C24DF0E18808}" type="datetimeFigureOut">
               <a:rPr lang="en-US" smtClean="0"/>
-              <a:t>2021-03-22</a:t>
+              <a:t>2021-03-23</a:t>
             </a:fld>
             <a:endParaRPr lang="en-US" dirty="0"/>
           </a:p>
@@ -2029,7 +2029,7 @@
           <a:p>
             <a:fld id="{7906AA06-BD78-4A04-91CE-C24DF0E18808}" type="datetimeFigureOut">
               <a:rPr lang="en-US" smtClean="0"/>
-              <a:t>2021-03-22</a:t>
+              <a:t>2021-03-23</a:t>
             </a:fld>
             <a:endParaRPr lang="en-US" dirty="0"/>
           </a:p>
@@ -2146,7 +2146,7 @@
           <a:p>
             <a:fld id="{7906AA06-BD78-4A04-91CE-C24DF0E18808}" type="datetimeFigureOut">
               <a:rPr lang="en-US" smtClean="0"/>
-              <a:t>2021-03-22</a:t>
+              <a:t>2021-03-23</a:t>
             </a:fld>
             <a:endParaRPr lang="en-US" dirty="0"/>
           </a:p>
@@ -2241,7 +2241,7 @@
           <a:p>
             <a:fld id="{7906AA06-BD78-4A04-91CE-C24DF0E18808}" type="datetimeFigureOut">
               <a:rPr lang="en-US" smtClean="0"/>
-              <a:t>2021-03-22</a:t>
+              <a:t>2021-03-23</a:t>
             </a:fld>
             <a:endParaRPr lang="en-US" dirty="0"/>
           </a:p>
@@ -2516,7 +2516,7 @@
           <a:p>
             <a:fld id="{7906AA06-BD78-4A04-91CE-C24DF0E18808}" type="datetimeFigureOut">
               <a:rPr lang="en-US" smtClean="0"/>
-              <a:t>2021-03-22</a:t>
+              <a:t>2021-03-23</a:t>
             </a:fld>
             <a:endParaRPr lang="en-US" dirty="0"/>
           </a:p>
@@ -2768,7 +2768,7 @@
           <a:p>
             <a:fld id="{7906AA06-BD78-4A04-91CE-C24DF0E18808}" type="datetimeFigureOut">
               <a:rPr lang="en-US" smtClean="0"/>
-              <a:t>2021-03-22</a:t>
+              <a:t>2021-03-23</a:t>
             </a:fld>
             <a:endParaRPr lang="en-US" dirty="0"/>
           </a:p>
@@ -2979,7 +2979,7 @@
           <a:p>
             <a:fld id="{7906AA06-BD78-4A04-91CE-C24DF0E18808}" type="datetimeFigureOut">
               <a:rPr lang="en-US" smtClean="0"/>
-              <a:t>2021-03-22</a:t>
+              <a:t>2021-03-23</a:t>
             </a:fld>
             <a:endParaRPr lang="en-US" dirty="0"/>
           </a:p>
@@ -6256,7 +6256,7 @@
           <p:nvPr>
             <p:extLst>
               <p:ext uri="{D42A27DB-BD31-4B8C-83A1-F6EECF244321}">
-                <p14:modId xmlns:p14="http://schemas.microsoft.com/office/powerpoint/2010/main" val="3591920991"/>
+                <p14:modId xmlns:p14="http://schemas.microsoft.com/office/powerpoint/2010/main" val="3049879400"/>
               </p:ext>
             </p:extLst>
           </p:nvPr>
@@ -6319,7 +6319,7 @@
           <p:nvPr>
             <p:extLst>
               <p:ext uri="{D42A27DB-BD31-4B8C-83A1-F6EECF244321}">
-                <p14:modId xmlns:p14="http://schemas.microsoft.com/office/powerpoint/2010/main" val="1810131310"/>
+                <p14:modId xmlns:p14="http://schemas.microsoft.com/office/powerpoint/2010/main" val="4294020540"/>
               </p:ext>
             </p:extLst>
           </p:nvPr>
@@ -6382,7 +6382,7 @@
           <p:nvPr>
             <p:extLst>
               <p:ext uri="{D42A27DB-BD31-4B8C-83A1-F6EECF244321}">
-                <p14:modId xmlns:p14="http://schemas.microsoft.com/office/powerpoint/2010/main" val="535485605"/>
+                <p14:modId xmlns:p14="http://schemas.microsoft.com/office/powerpoint/2010/main" val="2095852499"/>
               </p:ext>
             </p:extLst>
           </p:nvPr>
@@ -6445,7 +6445,7 @@
           <p:nvPr>
             <p:extLst>
               <p:ext uri="{D42A27DB-BD31-4B8C-83A1-F6EECF244321}">
-                <p14:modId xmlns:p14="http://schemas.microsoft.com/office/powerpoint/2010/main" val="111346741"/>
+                <p14:modId xmlns:p14="http://schemas.microsoft.com/office/powerpoint/2010/main" val="3587316124"/>
               </p:ext>
             </p:extLst>
           </p:nvPr>
@@ -6508,7 +6508,7 @@
           <p:nvPr>
             <p:extLst>
               <p:ext uri="{D42A27DB-BD31-4B8C-83A1-F6EECF244321}">
-                <p14:modId xmlns:p14="http://schemas.microsoft.com/office/powerpoint/2010/main" val="2127461403"/>
+                <p14:modId xmlns:p14="http://schemas.microsoft.com/office/powerpoint/2010/main" val="1042604356"/>
               </p:ext>
             </p:extLst>
           </p:nvPr>
@@ -6571,7 +6571,7 @@
           <p:nvPr>
             <p:extLst>
               <p:ext uri="{D42A27DB-BD31-4B8C-83A1-F6EECF244321}">
-                <p14:modId xmlns:p14="http://schemas.microsoft.com/office/powerpoint/2010/main" val="3891706676"/>
+                <p14:modId xmlns:p14="http://schemas.microsoft.com/office/powerpoint/2010/main" val="902976968"/>
               </p:ext>
             </p:extLst>
           </p:nvPr>

</xml_diff>

<commit_message>
completed separate inv_man m with ind_man m
</commit_message>
<xml_diff>
--- a/54 exchange.pptx
+++ b/54 exchange.pptx
@@ -197,7 +197,7 @@
           <a:p>
             <a:fld id="{50B5AD24-ECDF-4EDA-9C47-E358CABA4C31}" type="datetimeFigureOut">
               <a:rPr lang="en-US" smtClean="0"/>
-              <a:t>2021-03-23</a:t>
+              <a:t>2021-03-24</a:t>
             </a:fld>
             <a:endParaRPr lang="en-US" dirty="0"/>
           </a:p>
@@ -677,7 +677,7 @@
           <a:p>
             <a:fld id="{7906AA06-BD78-4A04-91CE-C24DF0E18808}" type="datetimeFigureOut">
               <a:rPr lang="en-US" smtClean="0"/>
-              <a:t>2021-03-23</a:t>
+              <a:t>2021-03-24</a:t>
             </a:fld>
             <a:endParaRPr lang="en-US" dirty="0"/>
           </a:p>
@@ -845,7 +845,7 @@
           <a:p>
             <a:fld id="{7906AA06-BD78-4A04-91CE-C24DF0E18808}" type="datetimeFigureOut">
               <a:rPr lang="en-US" smtClean="0"/>
-              <a:t>2021-03-23</a:t>
+              <a:t>2021-03-24</a:t>
             </a:fld>
             <a:endParaRPr lang="en-US" dirty="0"/>
           </a:p>
@@ -1023,7 +1023,7 @@
           <a:p>
             <a:fld id="{7906AA06-BD78-4A04-91CE-C24DF0E18808}" type="datetimeFigureOut">
               <a:rPr lang="en-US" smtClean="0"/>
-              <a:t>2021-03-23</a:t>
+              <a:t>2021-03-24</a:t>
             </a:fld>
             <a:endParaRPr lang="en-US" dirty="0"/>
           </a:p>
@@ -1191,7 +1191,7 @@
           <a:p>
             <a:fld id="{7906AA06-BD78-4A04-91CE-C24DF0E18808}" type="datetimeFigureOut">
               <a:rPr lang="en-US" smtClean="0"/>
-              <a:t>2021-03-23</a:t>
+              <a:t>2021-03-24</a:t>
             </a:fld>
             <a:endParaRPr lang="en-US" dirty="0"/>
           </a:p>
@@ -1436,7 +1436,7 @@
           <a:p>
             <a:fld id="{7906AA06-BD78-4A04-91CE-C24DF0E18808}" type="datetimeFigureOut">
               <a:rPr lang="en-US" smtClean="0"/>
-              <a:t>2021-03-23</a:t>
+              <a:t>2021-03-24</a:t>
             </a:fld>
             <a:endParaRPr lang="en-US" dirty="0"/>
           </a:p>
@@ -1665,7 +1665,7 @@
           <a:p>
             <a:fld id="{7906AA06-BD78-4A04-91CE-C24DF0E18808}" type="datetimeFigureOut">
               <a:rPr lang="en-US" smtClean="0"/>
-              <a:t>2021-03-23</a:t>
+              <a:t>2021-03-24</a:t>
             </a:fld>
             <a:endParaRPr lang="en-US" dirty="0"/>
           </a:p>
@@ -2029,7 +2029,7 @@
           <a:p>
             <a:fld id="{7906AA06-BD78-4A04-91CE-C24DF0E18808}" type="datetimeFigureOut">
               <a:rPr lang="en-US" smtClean="0"/>
-              <a:t>2021-03-23</a:t>
+              <a:t>2021-03-24</a:t>
             </a:fld>
             <a:endParaRPr lang="en-US" dirty="0"/>
           </a:p>
@@ -2146,7 +2146,7 @@
           <a:p>
             <a:fld id="{7906AA06-BD78-4A04-91CE-C24DF0E18808}" type="datetimeFigureOut">
               <a:rPr lang="en-US" smtClean="0"/>
-              <a:t>2021-03-23</a:t>
+              <a:t>2021-03-24</a:t>
             </a:fld>
             <a:endParaRPr lang="en-US" dirty="0"/>
           </a:p>
@@ -2241,7 +2241,7 @@
           <a:p>
             <a:fld id="{7906AA06-BD78-4A04-91CE-C24DF0E18808}" type="datetimeFigureOut">
               <a:rPr lang="en-US" smtClean="0"/>
-              <a:t>2021-03-23</a:t>
+              <a:t>2021-03-24</a:t>
             </a:fld>
             <a:endParaRPr lang="en-US" dirty="0"/>
           </a:p>
@@ -2516,7 +2516,7 @@
           <a:p>
             <a:fld id="{7906AA06-BD78-4A04-91CE-C24DF0E18808}" type="datetimeFigureOut">
               <a:rPr lang="en-US" smtClean="0"/>
-              <a:t>2021-03-23</a:t>
+              <a:t>2021-03-24</a:t>
             </a:fld>
             <a:endParaRPr lang="en-US" dirty="0"/>
           </a:p>
@@ -2768,7 +2768,7 @@
           <a:p>
             <a:fld id="{7906AA06-BD78-4A04-91CE-C24DF0E18808}" type="datetimeFigureOut">
               <a:rPr lang="en-US" smtClean="0"/>
-              <a:t>2021-03-23</a:t>
+              <a:t>2021-03-24</a:t>
             </a:fld>
             <a:endParaRPr lang="en-US" dirty="0"/>
           </a:p>
@@ -2979,7 +2979,7 @@
           <a:p>
             <a:fld id="{7906AA06-BD78-4A04-91CE-C24DF0E18808}" type="datetimeFigureOut">
               <a:rPr lang="en-US" smtClean="0"/>
-              <a:t>2021-03-23</a:t>
+              <a:t>2021-03-24</a:t>
             </a:fld>
             <a:endParaRPr lang="en-US" dirty="0"/>
           </a:p>
@@ -6256,7 +6256,7 @@
           <p:nvPr>
             <p:extLst>
               <p:ext uri="{D42A27DB-BD31-4B8C-83A1-F6EECF244321}">
-                <p14:modId xmlns:p14="http://schemas.microsoft.com/office/powerpoint/2010/main" val="3049879400"/>
+                <p14:modId xmlns:p14="http://schemas.microsoft.com/office/powerpoint/2010/main" val="1301177675"/>
               </p:ext>
             </p:extLst>
           </p:nvPr>
@@ -6319,7 +6319,7 @@
           <p:nvPr>
             <p:extLst>
               <p:ext uri="{D42A27DB-BD31-4B8C-83A1-F6EECF244321}">
-                <p14:modId xmlns:p14="http://schemas.microsoft.com/office/powerpoint/2010/main" val="4294020540"/>
+                <p14:modId xmlns:p14="http://schemas.microsoft.com/office/powerpoint/2010/main" val="860255766"/>
               </p:ext>
             </p:extLst>
           </p:nvPr>
@@ -6382,7 +6382,7 @@
           <p:nvPr>
             <p:extLst>
               <p:ext uri="{D42A27DB-BD31-4B8C-83A1-F6EECF244321}">
-                <p14:modId xmlns:p14="http://schemas.microsoft.com/office/powerpoint/2010/main" val="2095852499"/>
+                <p14:modId xmlns:p14="http://schemas.microsoft.com/office/powerpoint/2010/main" val="781066593"/>
               </p:ext>
             </p:extLst>
           </p:nvPr>
@@ -6445,7 +6445,7 @@
           <p:nvPr>
             <p:extLst>
               <p:ext uri="{D42A27DB-BD31-4B8C-83A1-F6EECF244321}">
-                <p14:modId xmlns:p14="http://schemas.microsoft.com/office/powerpoint/2010/main" val="3587316124"/>
+                <p14:modId xmlns:p14="http://schemas.microsoft.com/office/powerpoint/2010/main" val="528387026"/>
               </p:ext>
             </p:extLst>
           </p:nvPr>
@@ -6508,7 +6508,7 @@
           <p:nvPr>
             <p:extLst>
               <p:ext uri="{D42A27DB-BD31-4B8C-83A1-F6EECF244321}">
-                <p14:modId xmlns:p14="http://schemas.microsoft.com/office/powerpoint/2010/main" val="1042604356"/>
+                <p14:modId xmlns:p14="http://schemas.microsoft.com/office/powerpoint/2010/main" val="2180047482"/>
               </p:ext>
             </p:extLst>
           </p:nvPr>
@@ -6571,7 +6571,7 @@
           <p:nvPr>
             <p:extLst>
               <p:ext uri="{D42A27DB-BD31-4B8C-83A1-F6EECF244321}">
-                <p14:modId xmlns:p14="http://schemas.microsoft.com/office/powerpoint/2010/main" val="902976968"/>
+                <p14:modId xmlns:p14="http://schemas.microsoft.com/office/powerpoint/2010/main" val="3747061874"/>
               </p:ext>
             </p:extLst>
           </p:nvPr>

</xml_diff>

<commit_message>
created lose focus and grain focus
</commit_message>
<xml_diff>
--- a/54 exchange.pptx
+++ b/54 exchange.pptx
@@ -197,7 +197,7 @@
           <a:p>
             <a:fld id="{50B5AD24-ECDF-4EDA-9C47-E358CABA4C31}" type="datetimeFigureOut">
               <a:rPr lang="en-US" smtClean="0"/>
-              <a:t>2021-03-25</a:t>
+              <a:t>2021-03-26</a:t>
             </a:fld>
             <a:endParaRPr lang="en-US" dirty="0"/>
           </a:p>
@@ -677,7 +677,7 @@
           <a:p>
             <a:fld id="{7906AA06-BD78-4A04-91CE-C24DF0E18808}" type="datetimeFigureOut">
               <a:rPr lang="en-US" smtClean="0"/>
-              <a:t>2021-03-25</a:t>
+              <a:t>2021-03-26</a:t>
             </a:fld>
             <a:endParaRPr lang="en-US" dirty="0"/>
           </a:p>
@@ -845,7 +845,7 @@
           <a:p>
             <a:fld id="{7906AA06-BD78-4A04-91CE-C24DF0E18808}" type="datetimeFigureOut">
               <a:rPr lang="en-US" smtClean="0"/>
-              <a:t>2021-03-25</a:t>
+              <a:t>2021-03-26</a:t>
             </a:fld>
             <a:endParaRPr lang="en-US" dirty="0"/>
           </a:p>
@@ -1023,7 +1023,7 @@
           <a:p>
             <a:fld id="{7906AA06-BD78-4A04-91CE-C24DF0E18808}" type="datetimeFigureOut">
               <a:rPr lang="en-US" smtClean="0"/>
-              <a:t>2021-03-25</a:t>
+              <a:t>2021-03-26</a:t>
             </a:fld>
             <a:endParaRPr lang="en-US" dirty="0"/>
           </a:p>
@@ -1191,7 +1191,7 @@
           <a:p>
             <a:fld id="{7906AA06-BD78-4A04-91CE-C24DF0E18808}" type="datetimeFigureOut">
               <a:rPr lang="en-US" smtClean="0"/>
-              <a:t>2021-03-25</a:t>
+              <a:t>2021-03-26</a:t>
             </a:fld>
             <a:endParaRPr lang="en-US" dirty="0"/>
           </a:p>
@@ -1436,7 +1436,7 @@
           <a:p>
             <a:fld id="{7906AA06-BD78-4A04-91CE-C24DF0E18808}" type="datetimeFigureOut">
               <a:rPr lang="en-US" smtClean="0"/>
-              <a:t>2021-03-25</a:t>
+              <a:t>2021-03-26</a:t>
             </a:fld>
             <a:endParaRPr lang="en-US" dirty="0"/>
           </a:p>
@@ -1665,7 +1665,7 @@
           <a:p>
             <a:fld id="{7906AA06-BD78-4A04-91CE-C24DF0E18808}" type="datetimeFigureOut">
               <a:rPr lang="en-US" smtClean="0"/>
-              <a:t>2021-03-25</a:t>
+              <a:t>2021-03-26</a:t>
             </a:fld>
             <a:endParaRPr lang="en-US" dirty="0"/>
           </a:p>
@@ -2029,7 +2029,7 @@
           <a:p>
             <a:fld id="{7906AA06-BD78-4A04-91CE-C24DF0E18808}" type="datetimeFigureOut">
               <a:rPr lang="en-US" smtClean="0"/>
-              <a:t>2021-03-25</a:t>
+              <a:t>2021-03-26</a:t>
             </a:fld>
             <a:endParaRPr lang="en-US" dirty="0"/>
           </a:p>
@@ -2146,7 +2146,7 @@
           <a:p>
             <a:fld id="{7906AA06-BD78-4A04-91CE-C24DF0E18808}" type="datetimeFigureOut">
               <a:rPr lang="en-US" smtClean="0"/>
-              <a:t>2021-03-25</a:t>
+              <a:t>2021-03-26</a:t>
             </a:fld>
             <a:endParaRPr lang="en-US" dirty="0"/>
           </a:p>
@@ -2241,7 +2241,7 @@
           <a:p>
             <a:fld id="{7906AA06-BD78-4A04-91CE-C24DF0E18808}" type="datetimeFigureOut">
               <a:rPr lang="en-US" smtClean="0"/>
-              <a:t>2021-03-25</a:t>
+              <a:t>2021-03-26</a:t>
             </a:fld>
             <a:endParaRPr lang="en-US" dirty="0"/>
           </a:p>
@@ -2516,7 +2516,7 @@
           <a:p>
             <a:fld id="{7906AA06-BD78-4A04-91CE-C24DF0E18808}" type="datetimeFigureOut">
               <a:rPr lang="en-US" smtClean="0"/>
-              <a:t>2021-03-25</a:t>
+              <a:t>2021-03-26</a:t>
             </a:fld>
             <a:endParaRPr lang="en-US" dirty="0"/>
           </a:p>
@@ -2768,7 +2768,7 @@
           <a:p>
             <a:fld id="{7906AA06-BD78-4A04-91CE-C24DF0E18808}" type="datetimeFigureOut">
               <a:rPr lang="en-US" smtClean="0"/>
-              <a:t>2021-03-25</a:t>
+              <a:t>2021-03-26</a:t>
             </a:fld>
             <a:endParaRPr lang="en-US" dirty="0"/>
           </a:p>
@@ -2979,7 +2979,7 @@
           <a:p>
             <a:fld id="{7906AA06-BD78-4A04-91CE-C24DF0E18808}" type="datetimeFigureOut">
               <a:rPr lang="en-US" smtClean="0"/>
-              <a:t>2021-03-25</a:t>
+              <a:t>2021-03-26</a:t>
             </a:fld>
             <a:endParaRPr lang="en-US" dirty="0"/>
           </a:p>
@@ -6256,7 +6256,7 @@
           <p:nvPr>
             <p:extLst>
               <p:ext uri="{D42A27DB-BD31-4B8C-83A1-F6EECF244321}">
-                <p14:modId xmlns:p14="http://schemas.microsoft.com/office/powerpoint/2010/main" val="2380540653"/>
+                <p14:modId xmlns:p14="http://schemas.microsoft.com/office/powerpoint/2010/main" val="2692888831"/>
               </p:ext>
             </p:extLst>
           </p:nvPr>
@@ -6319,7 +6319,7 @@
           <p:nvPr>
             <p:extLst>
               <p:ext uri="{D42A27DB-BD31-4B8C-83A1-F6EECF244321}">
-                <p14:modId xmlns:p14="http://schemas.microsoft.com/office/powerpoint/2010/main" val="2831671019"/>
+                <p14:modId xmlns:p14="http://schemas.microsoft.com/office/powerpoint/2010/main" val="2373979314"/>
               </p:ext>
             </p:extLst>
           </p:nvPr>
@@ -6382,7 +6382,7 @@
           <p:nvPr>
             <p:extLst>
               <p:ext uri="{D42A27DB-BD31-4B8C-83A1-F6EECF244321}">
-                <p14:modId xmlns:p14="http://schemas.microsoft.com/office/powerpoint/2010/main" val="4078484093"/>
+                <p14:modId xmlns:p14="http://schemas.microsoft.com/office/powerpoint/2010/main" val="2263661300"/>
               </p:ext>
             </p:extLst>
           </p:nvPr>
@@ -6445,7 +6445,7 @@
           <p:nvPr>
             <p:extLst>
               <p:ext uri="{D42A27DB-BD31-4B8C-83A1-F6EECF244321}">
-                <p14:modId xmlns:p14="http://schemas.microsoft.com/office/powerpoint/2010/main" val="2923366396"/>
+                <p14:modId xmlns:p14="http://schemas.microsoft.com/office/powerpoint/2010/main" val="5602493"/>
               </p:ext>
             </p:extLst>
           </p:nvPr>
@@ -6508,7 +6508,7 @@
           <p:nvPr>
             <p:extLst>
               <p:ext uri="{D42A27DB-BD31-4B8C-83A1-F6EECF244321}">
-                <p14:modId xmlns:p14="http://schemas.microsoft.com/office/powerpoint/2010/main" val="2630753292"/>
+                <p14:modId xmlns:p14="http://schemas.microsoft.com/office/powerpoint/2010/main" val="3404550014"/>
               </p:ext>
             </p:extLst>
           </p:nvPr>
@@ -6571,7 +6571,7 @@
           <p:nvPr>
             <p:extLst>
               <p:ext uri="{D42A27DB-BD31-4B8C-83A1-F6EECF244321}">
-                <p14:modId xmlns:p14="http://schemas.microsoft.com/office/powerpoint/2010/main" val="4036443600"/>
+                <p14:modId xmlns:p14="http://schemas.microsoft.com/office/powerpoint/2010/main" val="254544655"/>
               </p:ext>
             </p:extLst>
           </p:nvPr>

</xml_diff>